<commit_message>
doc fix: rx/tx swapped.
</commit_message>
<xml_diff>
--- a/AE Cloud2 S5D9 Arduino Get Started Document.pptx
+++ b/AE Cloud2 S5D9 Arduino Get Started Document.pptx
@@ -263,7 +263,7 @@
           <a:p>
             <a:fld id="{EEABAAA2-B635-48D0-8F69-B5E0B304E374}" type="datetimeFigureOut">
               <a:rPr lang="en-US" smtClean="0"/>
-              <a:t>3/20/2019</a:t>
+              <a:t>4/3/2019</a:t>
             </a:fld>
             <a:endParaRPr lang="en-US"/>
           </a:p>
@@ -461,7 +461,7 @@
           <a:p>
             <a:fld id="{EEABAAA2-B635-48D0-8F69-B5E0B304E374}" type="datetimeFigureOut">
               <a:rPr lang="en-US" smtClean="0"/>
-              <a:t>3/20/2019</a:t>
+              <a:t>4/3/2019</a:t>
             </a:fld>
             <a:endParaRPr lang="en-US"/>
           </a:p>
@@ -669,7 +669,7 @@
           <a:p>
             <a:fld id="{EEABAAA2-B635-48D0-8F69-B5E0B304E374}" type="datetimeFigureOut">
               <a:rPr lang="en-US" smtClean="0"/>
-              <a:t>3/20/2019</a:t>
+              <a:t>4/3/2019</a:t>
             </a:fld>
             <a:endParaRPr lang="en-US"/>
           </a:p>
@@ -867,7 +867,7 @@
           <a:p>
             <a:fld id="{EEABAAA2-B635-48D0-8F69-B5E0B304E374}" type="datetimeFigureOut">
               <a:rPr lang="en-US" smtClean="0"/>
-              <a:t>3/20/2019</a:t>
+              <a:t>4/3/2019</a:t>
             </a:fld>
             <a:endParaRPr lang="en-US"/>
           </a:p>
@@ -1142,7 +1142,7 @@
           <a:p>
             <a:fld id="{EEABAAA2-B635-48D0-8F69-B5E0B304E374}" type="datetimeFigureOut">
               <a:rPr lang="en-US" smtClean="0"/>
-              <a:t>3/20/2019</a:t>
+              <a:t>4/3/2019</a:t>
             </a:fld>
             <a:endParaRPr lang="en-US"/>
           </a:p>
@@ -1407,7 +1407,7 @@
           <a:p>
             <a:fld id="{EEABAAA2-B635-48D0-8F69-B5E0B304E374}" type="datetimeFigureOut">
               <a:rPr lang="en-US" smtClean="0"/>
-              <a:t>3/20/2019</a:t>
+              <a:t>4/3/2019</a:t>
             </a:fld>
             <a:endParaRPr lang="en-US"/>
           </a:p>
@@ -1819,7 +1819,7 @@
           <a:p>
             <a:fld id="{EEABAAA2-B635-48D0-8F69-B5E0B304E374}" type="datetimeFigureOut">
               <a:rPr lang="en-US" smtClean="0"/>
-              <a:t>3/20/2019</a:t>
+              <a:t>4/3/2019</a:t>
             </a:fld>
             <a:endParaRPr lang="en-US"/>
           </a:p>
@@ -1960,7 +1960,7 @@
           <a:p>
             <a:fld id="{EEABAAA2-B635-48D0-8F69-B5E0B304E374}" type="datetimeFigureOut">
               <a:rPr lang="en-US" smtClean="0"/>
-              <a:t>3/20/2019</a:t>
+              <a:t>4/3/2019</a:t>
             </a:fld>
             <a:endParaRPr lang="en-US"/>
           </a:p>
@@ -2073,7 +2073,7 @@
           <a:p>
             <a:fld id="{EEABAAA2-B635-48D0-8F69-B5E0B304E374}" type="datetimeFigureOut">
               <a:rPr lang="en-US" smtClean="0"/>
-              <a:t>3/20/2019</a:t>
+              <a:t>4/3/2019</a:t>
             </a:fld>
             <a:endParaRPr lang="en-US"/>
           </a:p>
@@ -2384,7 +2384,7 @@
           <a:p>
             <a:fld id="{EEABAAA2-B635-48D0-8F69-B5E0B304E374}" type="datetimeFigureOut">
               <a:rPr lang="en-US" smtClean="0"/>
-              <a:t>3/20/2019</a:t>
+              <a:t>4/3/2019</a:t>
             </a:fld>
             <a:endParaRPr lang="en-US"/>
           </a:p>
@@ -2672,7 +2672,7 @@
           <a:p>
             <a:fld id="{EEABAAA2-B635-48D0-8F69-B5E0B304E374}" type="datetimeFigureOut">
               <a:rPr lang="en-US" smtClean="0"/>
-              <a:t>3/20/2019</a:t>
+              <a:t>4/3/2019</a:t>
             </a:fld>
             <a:endParaRPr lang="en-US"/>
           </a:p>
@@ -2913,7 +2913,7 @@
           <a:p>
             <a:fld id="{EEABAAA2-B635-48D0-8F69-B5E0B304E374}" type="datetimeFigureOut">
               <a:rPr lang="en-US" smtClean="0"/>
-              <a:t>3/20/2019</a:t>
+              <a:t>4/3/2019</a:t>
             </a:fld>
             <a:endParaRPr lang="en-US"/>
           </a:p>
@@ -3796,7 +3796,7 @@
           <p:nvPr>
             <p:extLst>
               <p:ext uri="{D42A27DB-BD31-4B8C-83A1-F6EECF244321}">
-                <p14:modId xmlns:p14="http://schemas.microsoft.com/office/powerpoint/2010/main" val="987847333"/>
+                <p14:modId xmlns:p14="http://schemas.microsoft.com/office/powerpoint/2010/main" val="4225991490"/>
               </p:ext>
             </p:extLst>
           </p:nvPr>
@@ -3931,7 +3931,7 @@
                     <a:p>
                       <a:r>
                         <a:rPr lang="en-US" sz="1000" dirty="0"/>
-                        <a:t>TX </a:t>
+                        <a:t>RX </a:t>
                       </a:r>
                     </a:p>
                   </a:txBody>
@@ -3990,7 +3990,7 @@
                     <a:p>
                       <a:r>
                         <a:rPr lang="en-US" sz="1000" dirty="0"/>
-                        <a:t>RX</a:t>
+                        <a:t>TX</a:t>
                       </a:r>
                     </a:p>
                   </a:txBody>
@@ -5495,7 +5495,7 @@
           <p:nvPr>
             <p:extLst>
               <p:ext uri="{D42A27DB-BD31-4B8C-83A1-F6EECF244321}">
-                <p14:modId xmlns:p14="http://schemas.microsoft.com/office/powerpoint/2010/main" val="1546293340"/>
+                <p14:modId xmlns:p14="http://schemas.microsoft.com/office/powerpoint/2010/main" val="1861623597"/>
               </p:ext>
             </p:extLst>
           </p:nvPr>
@@ -5630,7 +5630,7 @@
                     <a:p>
                       <a:r>
                         <a:rPr lang="en-US" sz="1000" dirty="0"/>
-                        <a:t>TX</a:t>
+                        <a:t>RX</a:t>
                       </a:r>
                     </a:p>
                   </a:txBody>
@@ -5676,8 +5676,13 @@
                     <a:p>
                       <a:r>
                         <a:rPr lang="en-US" sz="1000" dirty="0"/>
-                        <a:t>RX</a:t>
-                      </a:r>
+                        <a:t>T</a:t>
+                      </a:r>
+                      <a:r>
+                        <a:rPr lang="en-US" sz="1000"/>
+                        <a:t>X</a:t>
+                      </a:r>
+                      <a:endParaRPr lang="en-US" sz="1000" dirty="0"/>
                     </a:p>
                   </a:txBody>
                   <a:tcPr/>

</xml_diff>